<commit_message>
edit poster with image
</commit_message>
<xml_diff>
--- a/UGS_FYP_Poster_CS10899.pptx
+++ b/UGS_FYP_Poster_CS10899.pptx
@@ -373,7 +373,7 @@
           <a:noFill/>
           <a:extLst>
             <a:ext uri="{909E8E84-426E-40dd-AFC4-6F175D3DCCD1}">
-              <a14:hiddenFill xmlns:a14="http://schemas.microsoft.com/office/drawing/2010/main" xmlns="">
+              <a14:hiddenFill xmlns="" xmlns:a14="http://schemas.microsoft.com/office/drawing/2010/main">
                 <a:solidFill>
                   <a:srgbClr val="FFFFFF"/>
                 </a:solidFill>
@@ -420,7 +420,7 @@
           <a:noFill/>
           <a:extLst>
             <a:ext uri="{909E8E84-426E-40dd-AFC4-6F175D3DCCD1}">
-              <a14:hiddenFill xmlns:a14="http://schemas.microsoft.com/office/drawing/2010/main" xmlns="">
+              <a14:hiddenFill xmlns="" xmlns:a14="http://schemas.microsoft.com/office/drawing/2010/main">
                 <a:solidFill>
                   <a:srgbClr val="FFFFFF"/>
                 </a:solidFill>
@@ -1106,7 +1106,7 @@
           </a:ln>
           <a:extLst>
             <a:ext uri="{C572A759-6A51-4108-AA02-DFA0A04FC94B}">
-              <ma14:wrappingTextBoxFlag xmlns="" xmlns:ma14="http://schemas.microsoft.com/office/mac/drawingml/2011/main" val="1"/>
+              <ma14:wrappingTextBoxFlag xmlns:ma14="http://schemas.microsoft.com/office/mac/drawingml/2011/main" xmlns="" val="1"/>
             </a:ext>
           </a:extLst>
         </p:spPr>
@@ -1319,7 +1319,7 @@
           </a:ln>
           <a:extLst>
             <a:ext uri="{C572A759-6A51-4108-AA02-DFA0A04FC94B}">
-              <ma14:wrappingTextBoxFlag xmlns="" xmlns:ma14="http://schemas.microsoft.com/office/mac/drawingml/2011/main" val="1"/>
+              <ma14:wrappingTextBoxFlag xmlns:ma14="http://schemas.microsoft.com/office/mac/drawingml/2011/main" xmlns="" val="1"/>
             </a:ext>
           </a:extLst>
         </p:spPr>
@@ -1519,7 +1519,7 @@
           </a:ln>
           <a:extLst>
             <a:ext uri="{C572A759-6A51-4108-AA02-DFA0A04FC94B}">
-              <ma14:wrappingTextBoxFlag xmlns="" xmlns:ma14="http://schemas.microsoft.com/office/mac/drawingml/2011/main" val="1"/>
+              <ma14:wrappingTextBoxFlag xmlns:ma14="http://schemas.microsoft.com/office/mac/drawingml/2011/main" xmlns="" val="1"/>
             </a:ext>
           </a:extLst>
         </p:spPr>
@@ -1614,7 +1614,7 @@
           </a:ln>
           <a:extLst>
             <a:ext uri="{C572A759-6A51-4108-AA02-DFA0A04FC94B}">
-              <ma14:wrappingTextBoxFlag xmlns="" xmlns:ma14="http://schemas.microsoft.com/office/mac/drawingml/2011/main" val="1"/>
+              <ma14:wrappingTextBoxFlag xmlns:ma14="http://schemas.microsoft.com/office/mac/drawingml/2011/main" xmlns="" val="1"/>
             </a:ext>
           </a:extLst>
         </p:spPr>
@@ -1795,7 +1795,7 @@
           </a:ln>
           <a:extLst>
             <a:ext uri="{C572A759-6A51-4108-AA02-DFA0A04FC94B}">
-              <ma14:wrappingTextBoxFlag xmlns="" xmlns:ma14="http://schemas.microsoft.com/office/mac/drawingml/2011/main" val="1"/>
+              <ma14:wrappingTextBoxFlag xmlns:ma14="http://schemas.microsoft.com/office/mac/drawingml/2011/main" xmlns="" val="1"/>
             </a:ext>
           </a:extLst>
         </p:spPr>
@@ -2661,7 +2661,7 @@
           </a:ln>
           <a:extLst>
             <a:ext uri="{C572A759-6A51-4108-AA02-DFA0A04FC94B}">
-              <ma14:wrappingTextBoxFlag xmlns="" xmlns:ma14="http://schemas.microsoft.com/office/mac/drawingml/2011/main" val="1"/>
+              <ma14:wrappingTextBoxFlag xmlns:ma14="http://schemas.microsoft.com/office/mac/drawingml/2011/main" xmlns="" val="1"/>
             </a:ext>
           </a:extLst>
         </p:spPr>
@@ -2989,7 +2989,7 @@
           </a:ln>
           <a:extLst>
             <a:ext uri="{C572A759-6A51-4108-AA02-DFA0A04FC94B}">
-              <ma14:wrappingTextBoxFlag xmlns="" xmlns:ma14="http://schemas.microsoft.com/office/mac/drawingml/2011/main" val="1"/>
+              <ma14:wrappingTextBoxFlag xmlns:ma14="http://schemas.microsoft.com/office/mac/drawingml/2011/main" xmlns="" val="1"/>
             </a:ext>
           </a:extLst>
         </p:spPr>
@@ -3165,10 +3165,10 @@
       </p:sp>
       <p:pic>
         <p:nvPicPr>
-          <p:cNvPr id="58" name="Picture 57" descr="A picture containing clock, drawing&#10;&#10;Description automatically generated">
-            <a:extLst>
-              <a:ext uri="{FF2B5EF4-FFF2-40B4-BE49-F238E27FC236}">
-                <a16:creationId xmlns:a16="http://schemas.microsoft.com/office/drawing/2014/main" id="{99AFAF36-C69C-4BE6-A0EE-0B65391EB505}"/>
+          <p:cNvPr id="59" name="Picture 58" descr="A picture containing drawing, clock, window&#10;&#10;Description automatically generated">
+            <a:extLst>
+              <a:ext uri="{FF2B5EF4-FFF2-40B4-BE49-F238E27FC236}">
+                <a16:creationId xmlns:a16="http://schemas.microsoft.com/office/drawing/2014/main" id="{CED10C2F-A9FE-4AF7-A1F8-0D709EB6A35C}"/>
               </a:ext>
             </a:extLst>
           </p:cNvPr>
@@ -3178,7 +3178,7 @@
           <p:nvPr/>
         </p:nvPicPr>
         <p:blipFill>
-          <a:blip r:embed="rId8" cstate="print">
+          <a:blip r:embed="rId4" cstate="print">
             <a:extLst>
               <a:ext uri="{28A0092B-C50C-407E-A947-70E740481C1C}">
                 <a14:useLocalDpi xmlns:a14="http://schemas.microsoft.com/office/drawing/2010/main" val="0"/>
@@ -3191,42 +3191,6 @@
         </p:blipFill>
         <p:spPr>
           <a:xfrm>
-            <a:off x="17387368" y="21258774"/>
-            <a:ext cx="1493540" cy="3004605"/>
-          </a:xfrm>
-          <a:prstGeom prst="rect">
-            <a:avLst/>
-          </a:prstGeom>
-        </p:spPr>
-      </p:pic>
-      <p:pic>
-        <p:nvPicPr>
-          <p:cNvPr id="59" name="Picture 58" descr="A picture containing drawing, clock, window&#10;&#10;Description automatically generated">
-            <a:extLst>
-              <a:ext uri="{FF2B5EF4-FFF2-40B4-BE49-F238E27FC236}">
-                <a16:creationId xmlns:a16="http://schemas.microsoft.com/office/drawing/2014/main" id="{CED10C2F-A9FE-4AF7-A1F8-0D709EB6A35C}"/>
-              </a:ext>
-            </a:extLst>
-          </p:cNvPr>
-          <p:cNvPicPr>
-            <a:picLocks noChangeAspect="1"/>
-          </p:cNvPicPr>
-          <p:nvPr/>
-        </p:nvPicPr>
-        <p:blipFill>
-          <a:blip r:embed="rId4" cstate="print">
-            <a:extLst>
-              <a:ext uri="{28A0092B-C50C-407E-A947-70E740481C1C}">
-                <a14:useLocalDpi xmlns:a14="http://schemas.microsoft.com/office/drawing/2010/main" val="0"/>
-              </a:ext>
-            </a:extLst>
-          </a:blip>
-          <a:stretch>
-            <a:fillRect/>
-          </a:stretch>
-        </p:blipFill>
-        <p:spPr>
-          <a:xfrm>
             <a:off x="19142558" y="21258773"/>
             <a:ext cx="1495478" cy="2992899"/>
           </a:xfrm>
@@ -3250,7 +3214,7 @@
           <p:nvPr/>
         </p:nvPicPr>
         <p:blipFill>
-          <a:blip r:embed="rId9" cstate="print">
+          <a:blip r:embed="rId8" cstate="print">
             <a:extLst>
               <a:ext uri="{28A0092B-C50C-407E-A947-70E740481C1C}">
                 <a14:useLocalDpi xmlns:a14="http://schemas.microsoft.com/office/drawing/2010/main" val="0"/>
@@ -3333,7 +3297,7 @@
           </a:ln>
           <a:extLst>
             <a:ext uri="{C572A759-6A51-4108-AA02-DFA0A04FC94B}">
-              <ma14:wrappingTextBoxFlag xmlns="" xmlns:ma14="http://schemas.microsoft.com/office/mac/drawingml/2011/main" val="1"/>
+              <ma14:wrappingTextBoxFlag xmlns:ma14="http://schemas.microsoft.com/office/mac/drawingml/2011/main" xmlns="" val="1"/>
             </a:ext>
           </a:extLst>
         </p:spPr>
@@ -3564,7 +3528,7 @@
           </a:ln>
           <a:extLst>
             <a:ext uri="{C572A759-6A51-4108-AA02-DFA0A04FC94B}">
-              <ma14:wrappingTextBoxFlag xmlns="" xmlns:ma14="http://schemas.microsoft.com/office/mac/drawingml/2011/main" val="1"/>
+              <ma14:wrappingTextBoxFlag xmlns:ma14="http://schemas.microsoft.com/office/mac/drawingml/2011/main" xmlns="" val="1"/>
             </a:ext>
           </a:extLst>
         </p:spPr>
@@ -3721,7 +3685,7 @@
           <p:nvPr/>
         </p:nvPicPr>
         <p:blipFill>
-          <a:blip r:embed="rId10">
+          <a:blip r:embed="rId9">
             <a:extLst>
               <a:ext uri="{28A0092B-C50C-407E-A947-70E740481C1C}">
                 <a14:useLocalDpi xmlns:a14="http://schemas.microsoft.com/office/drawing/2010/main" val="0"/>
@@ -3757,7 +3721,7 @@
           <p:nvPr/>
         </p:nvPicPr>
         <p:blipFill>
-          <a:blip r:embed="rId11">
+          <a:blip r:embed="rId10">
             <a:extLst>
               <a:ext uri="{28A0092B-C50C-407E-A947-70E740481C1C}">
                 <a14:useLocalDpi xmlns:a14="http://schemas.microsoft.com/office/drawing/2010/main" val="0"/>
@@ -4066,7 +4030,7 @@
           <p:nvPr/>
         </p:nvPicPr>
         <p:blipFill>
-          <a:blip r:embed="rId12" cstate="print">
+          <a:blip r:embed="rId11" cstate="print">
             <a:extLst>
               <a:ext uri="{28A0092B-C50C-407E-A947-70E740481C1C}">
                 <a14:useLocalDpi xmlns:a14="http://schemas.microsoft.com/office/drawing/2010/main" val="0"/>
@@ -4081,6 +4045,42 @@
           <a:xfrm>
             <a:off x="19896206" y="0"/>
             <a:ext cx="1490594" cy="1620000"/>
+          </a:xfrm>
+          <a:prstGeom prst="rect">
+            <a:avLst/>
+          </a:prstGeom>
+        </p:spPr>
+      </p:pic>
+      <p:pic>
+        <p:nvPicPr>
+          <p:cNvPr id="3" name="Picture 2" descr="A picture containing drawing, clock&#10;&#10;Description automatically generated">
+            <a:extLst>
+              <a:ext uri="{FF2B5EF4-FFF2-40B4-BE49-F238E27FC236}">
+                <a16:creationId xmlns:a16="http://schemas.microsoft.com/office/drawing/2014/main" id="{0BFBFBDD-FC7B-4A53-82B5-808D797CA3B4}"/>
+              </a:ext>
+            </a:extLst>
+          </p:cNvPr>
+          <p:cNvPicPr>
+            <a:picLocks noChangeAspect="1"/>
+          </p:cNvPicPr>
+          <p:nvPr/>
+        </p:nvPicPr>
+        <p:blipFill>
+          <a:blip r:embed="rId12" cstate="print">
+            <a:extLst>
+              <a:ext uri="{28A0092B-C50C-407E-A947-70E740481C1C}">
+                <a14:useLocalDpi xmlns:a14="http://schemas.microsoft.com/office/drawing/2010/main" val="0"/>
+              </a:ext>
+            </a:extLst>
+          </a:blip>
+          <a:stretch>
+            <a:fillRect/>
+          </a:stretch>
+        </p:blipFill>
+        <p:spPr>
+          <a:xfrm>
+            <a:off x="17386130" y="21269739"/>
+            <a:ext cx="1495478" cy="3000691"/>
           </a:xfrm>
           <a:prstGeom prst="rect">
             <a:avLst/>

</xml_diff>

<commit_message>
Drift check function with changes made to poster
</commit_message>
<xml_diff>
--- a/UGS_FYP_Poster_CS10899.pptx
+++ b/UGS_FYP_Poster_CS10899.pptx
@@ -223,7 +223,7 @@
           <a:p>
             <a:fld id="{D3FE56BA-03B8-4704-9319-ED79A82C4EFE}" type="datetimeFigureOut">
               <a:rPr lang="en-GB" smtClean="0"/>
-              <a:t>17/02/2020</a:t>
+              <a:t>21/02/2020</a:t>
             </a:fld>
             <a:endParaRPr lang="en-GB"/>
           </a:p>
@@ -373,7 +373,7 @@
           <a:noFill/>
           <a:extLst>
             <a:ext uri="{909E8E84-426E-40dd-AFC4-6F175D3DCCD1}">
-              <a14:hiddenFill xmlns="" xmlns:a14="http://schemas.microsoft.com/office/drawing/2010/main">
+              <a14:hiddenFill xmlns:a14="http://schemas.microsoft.com/office/drawing/2010/main" xmlns="">
                 <a:solidFill>
                   <a:srgbClr val="FFFFFF"/>
                 </a:solidFill>
@@ -420,7 +420,7 @@
           <a:noFill/>
           <a:extLst>
             <a:ext uri="{909E8E84-426E-40dd-AFC4-6F175D3DCCD1}">
-              <a14:hiddenFill xmlns="" xmlns:a14="http://schemas.microsoft.com/office/drawing/2010/main">
+              <a14:hiddenFill xmlns:a14="http://schemas.microsoft.com/office/drawing/2010/main" xmlns="">
                 <a:solidFill>
                   <a:srgbClr val="FFFFFF"/>
                 </a:solidFill>
@@ -1106,7 +1106,7 @@
           </a:ln>
           <a:extLst>
             <a:ext uri="{C572A759-6A51-4108-AA02-DFA0A04FC94B}">
-              <ma14:wrappingTextBoxFlag xmlns:ma14="http://schemas.microsoft.com/office/mac/drawingml/2011/main" xmlns="" val="1"/>
+              <ma14:wrappingTextBoxFlag xmlns="" xmlns:ma14="http://schemas.microsoft.com/office/mac/drawingml/2011/main" val="1"/>
             </a:ext>
           </a:extLst>
         </p:spPr>
@@ -1319,7 +1319,7 @@
           </a:ln>
           <a:extLst>
             <a:ext uri="{C572A759-6A51-4108-AA02-DFA0A04FC94B}">
-              <ma14:wrappingTextBoxFlag xmlns:ma14="http://schemas.microsoft.com/office/mac/drawingml/2011/main" xmlns="" val="1"/>
+              <ma14:wrappingTextBoxFlag xmlns="" xmlns:ma14="http://schemas.microsoft.com/office/mac/drawingml/2011/main" val="1"/>
             </a:ext>
           </a:extLst>
         </p:spPr>
@@ -1519,7 +1519,7 @@
           </a:ln>
           <a:extLst>
             <a:ext uri="{C572A759-6A51-4108-AA02-DFA0A04FC94B}">
-              <ma14:wrappingTextBoxFlag xmlns:ma14="http://schemas.microsoft.com/office/mac/drawingml/2011/main" xmlns="" val="1"/>
+              <ma14:wrappingTextBoxFlag xmlns="" xmlns:ma14="http://schemas.microsoft.com/office/mac/drawingml/2011/main" val="1"/>
             </a:ext>
           </a:extLst>
         </p:spPr>
@@ -1614,7 +1614,7 @@
           </a:ln>
           <a:extLst>
             <a:ext uri="{C572A759-6A51-4108-AA02-DFA0A04FC94B}">
-              <ma14:wrappingTextBoxFlag xmlns:ma14="http://schemas.microsoft.com/office/mac/drawingml/2011/main" xmlns="" val="1"/>
+              <ma14:wrappingTextBoxFlag xmlns="" xmlns:ma14="http://schemas.microsoft.com/office/mac/drawingml/2011/main" val="1"/>
             </a:ext>
           </a:extLst>
         </p:spPr>
@@ -1795,7 +1795,7 @@
           </a:ln>
           <a:extLst>
             <a:ext uri="{C572A759-6A51-4108-AA02-DFA0A04FC94B}">
-              <ma14:wrappingTextBoxFlag xmlns:ma14="http://schemas.microsoft.com/office/mac/drawingml/2011/main" xmlns="" val="1"/>
+              <ma14:wrappingTextBoxFlag xmlns="" xmlns:ma14="http://schemas.microsoft.com/office/mac/drawingml/2011/main" val="1"/>
             </a:ext>
           </a:extLst>
         </p:spPr>
@@ -2661,7 +2661,7 @@
           </a:ln>
           <a:extLst>
             <a:ext uri="{C572A759-6A51-4108-AA02-DFA0A04FC94B}">
-              <ma14:wrappingTextBoxFlag xmlns:ma14="http://schemas.microsoft.com/office/mac/drawingml/2011/main" xmlns="" val="1"/>
+              <ma14:wrappingTextBoxFlag xmlns="" xmlns:ma14="http://schemas.microsoft.com/office/mac/drawingml/2011/main" val="1"/>
             </a:ext>
           </a:extLst>
         </p:spPr>
@@ -2989,7 +2989,7 @@
           </a:ln>
           <a:extLst>
             <a:ext uri="{C572A759-6A51-4108-AA02-DFA0A04FC94B}">
-              <ma14:wrappingTextBoxFlag xmlns:ma14="http://schemas.microsoft.com/office/mac/drawingml/2011/main" xmlns="" val="1"/>
+              <ma14:wrappingTextBoxFlag xmlns="" xmlns:ma14="http://schemas.microsoft.com/office/mac/drawingml/2011/main" val="1"/>
             </a:ext>
           </a:extLst>
         </p:spPr>
@@ -3297,7 +3297,7 @@
           </a:ln>
           <a:extLst>
             <a:ext uri="{C572A759-6A51-4108-AA02-DFA0A04FC94B}">
-              <ma14:wrappingTextBoxFlag xmlns:ma14="http://schemas.microsoft.com/office/mac/drawingml/2011/main" xmlns="" val="1"/>
+              <ma14:wrappingTextBoxFlag xmlns="" xmlns:ma14="http://schemas.microsoft.com/office/mac/drawingml/2011/main" val="1"/>
             </a:ext>
           </a:extLst>
         </p:spPr>
@@ -3329,26 +3329,16 @@
             </a:r>
           </a:p>
           <a:p>
-            <a:pPr marL="457200" indent="-457200" algn="just">
-              <a:spcBef>
-                <a:spcPts val="699"/>
-              </a:spcBef>
-              <a:buFont typeface="Arial" panose="020B0604020202020204" pitchFamily="34" charset="0"/>
-              <a:buChar char="•"/>
-              <a:defRPr sz="1800">
-                <a:solidFill>
-                  <a:srgbClr val="000000"/>
-                </a:solidFill>
-              </a:defRPr>
-            </a:pPr>
-            <a:r>
-              <a:rPr lang="en-SG" sz="3200" dirty="0">
-                <a:ea typeface="CMU Sans Serif"/>
-                <a:cs typeface="CMU Sans Serif"/>
-                <a:sym typeface="CMU Sans Serif"/>
-              </a:rPr>
-              <a:t>Insert graph</a:t>
-            </a:r>
+            <a:pPr algn="just">
+              <a:spcBef>
+                <a:spcPts val="699"/>
+              </a:spcBef>
+              <a:defRPr sz="1800">
+                <a:solidFill>
+                  <a:srgbClr val="000000"/>
+                </a:solidFill>
+              </a:defRPr>
+            </a:pPr>
             <a:endParaRPr lang="en-US" sz="3200" dirty="0">
               <a:ea typeface="CMU Sans Serif"/>
               <a:cs typeface="CMU Sans Serif"/>
@@ -3528,7 +3518,7 @@
           </a:ln>
           <a:extLst>
             <a:ext uri="{C572A759-6A51-4108-AA02-DFA0A04FC94B}">
-              <ma14:wrappingTextBoxFlag xmlns:ma14="http://schemas.microsoft.com/office/mac/drawingml/2011/main" xmlns="" val="1"/>
+              <ma14:wrappingTextBoxFlag xmlns="" xmlns:ma14="http://schemas.microsoft.com/office/mac/drawingml/2011/main" val="1"/>
             </a:ext>
           </a:extLst>
         </p:spPr>
@@ -4081,6 +4071,66 @@
           <a:xfrm>
             <a:off x="17386130" y="21269739"/>
             <a:ext cx="1495478" cy="3000691"/>
+          </a:xfrm>
+          <a:prstGeom prst="rect">
+            <a:avLst/>
+          </a:prstGeom>
+        </p:spPr>
+      </p:pic>
+      <p:pic>
+        <p:nvPicPr>
+          <p:cNvPr id="6" name="Picture 5">
+            <a:extLst>
+              <a:ext uri="{FF2B5EF4-FFF2-40B4-BE49-F238E27FC236}">
+                <a16:creationId xmlns:a16="http://schemas.microsoft.com/office/drawing/2014/main" id="{C8841152-93D5-4096-89A3-2BDAAD3180C9}"/>
+              </a:ext>
+            </a:extLst>
+          </p:cNvPr>
+          <p:cNvPicPr>
+            <a:picLocks noChangeAspect="1"/>
+          </p:cNvPicPr>
+          <p:nvPr/>
+        </p:nvPicPr>
+        <p:blipFill>
+          <a:blip r:embed="rId13"/>
+          <a:stretch>
+            <a:fillRect/>
+          </a:stretch>
+        </p:blipFill>
+        <p:spPr>
+          <a:xfrm>
+            <a:off x="9997879" y="24220522"/>
+            <a:ext cx="3618880" cy="3322394"/>
+          </a:xfrm>
+          <a:prstGeom prst="rect">
+            <a:avLst/>
+          </a:prstGeom>
+        </p:spPr>
+      </p:pic>
+      <p:pic>
+        <p:nvPicPr>
+          <p:cNvPr id="7" name="Picture 6">
+            <a:extLst>
+              <a:ext uri="{FF2B5EF4-FFF2-40B4-BE49-F238E27FC236}">
+                <a16:creationId xmlns:a16="http://schemas.microsoft.com/office/drawing/2014/main" id="{31794EEC-7606-4D89-AA84-0C93FA5F1E08}"/>
+              </a:ext>
+            </a:extLst>
+          </p:cNvPr>
+          <p:cNvPicPr>
+            <a:picLocks noChangeAspect="1"/>
+          </p:cNvPicPr>
+          <p:nvPr/>
+        </p:nvPicPr>
+        <p:blipFill>
+          <a:blip r:embed="rId14"/>
+          <a:stretch>
+            <a:fillRect/>
+          </a:stretch>
+        </p:blipFill>
+        <p:spPr>
+          <a:xfrm>
+            <a:off x="13593609" y="24159416"/>
+            <a:ext cx="3705737" cy="3383499"/>
           </a:xfrm>
           <a:prstGeom prst="rect">
             <a:avLst/>

</xml_diff>

<commit_message>
Made changes to time log as well as the poster
</commit_message>
<xml_diff>
--- a/UGS_FYP_Poster_CS10899.pptx
+++ b/UGS_FYP_Poster_CS10899.pptx
@@ -373,7 +373,7 @@
           <a:noFill/>
           <a:extLst>
             <a:ext uri="{909E8E84-426E-40dd-AFC4-6F175D3DCCD1}">
-              <a14:hiddenFill xmlns="" xmlns:a14="http://schemas.microsoft.com/office/drawing/2010/main">
+              <a14:hiddenFill xmlns:a14="http://schemas.microsoft.com/office/drawing/2010/main" xmlns="">
                 <a:solidFill>
                   <a:srgbClr val="FFFFFF"/>
                 </a:solidFill>
@@ -420,7 +420,7 @@
           <a:noFill/>
           <a:extLst>
             <a:ext uri="{909E8E84-426E-40dd-AFC4-6F175D3DCCD1}">
-              <a14:hiddenFill xmlns="" xmlns:a14="http://schemas.microsoft.com/office/drawing/2010/main">
+              <a14:hiddenFill xmlns:a14="http://schemas.microsoft.com/office/drawing/2010/main" xmlns="">
                 <a:solidFill>
                   <a:srgbClr val="FFFFFF"/>
                 </a:solidFill>
@@ -1106,7 +1106,7 @@
           </a:ln>
           <a:extLst>
             <a:ext uri="{C572A759-6A51-4108-AA02-DFA0A04FC94B}">
-              <ma14:wrappingTextBoxFlag xmlns:ma14="http://schemas.microsoft.com/office/mac/drawingml/2011/main" xmlns="" val="1"/>
+              <ma14:wrappingTextBoxFlag xmlns="" xmlns:ma14="http://schemas.microsoft.com/office/mac/drawingml/2011/main" val="1"/>
             </a:ext>
           </a:extLst>
         </p:spPr>
@@ -1319,7 +1319,7 @@
           </a:ln>
           <a:extLst>
             <a:ext uri="{C572A759-6A51-4108-AA02-DFA0A04FC94B}">
-              <ma14:wrappingTextBoxFlag xmlns:ma14="http://schemas.microsoft.com/office/mac/drawingml/2011/main" xmlns="" val="1"/>
+              <ma14:wrappingTextBoxFlag xmlns="" xmlns:ma14="http://schemas.microsoft.com/office/mac/drawingml/2011/main" val="1"/>
             </a:ext>
           </a:extLst>
         </p:spPr>
@@ -1519,7 +1519,7 @@
           </a:ln>
           <a:extLst>
             <a:ext uri="{C572A759-6A51-4108-AA02-DFA0A04FC94B}">
-              <ma14:wrappingTextBoxFlag xmlns:ma14="http://schemas.microsoft.com/office/mac/drawingml/2011/main" xmlns="" val="1"/>
+              <ma14:wrappingTextBoxFlag xmlns="" xmlns:ma14="http://schemas.microsoft.com/office/mac/drawingml/2011/main" val="1"/>
             </a:ext>
           </a:extLst>
         </p:spPr>
@@ -1614,7 +1614,7 @@
           </a:ln>
           <a:extLst>
             <a:ext uri="{C572A759-6A51-4108-AA02-DFA0A04FC94B}">
-              <ma14:wrappingTextBoxFlag xmlns:ma14="http://schemas.microsoft.com/office/mac/drawingml/2011/main" xmlns="" val="1"/>
+              <ma14:wrappingTextBoxFlag xmlns="" xmlns:ma14="http://schemas.microsoft.com/office/mac/drawingml/2011/main" val="1"/>
             </a:ext>
           </a:extLst>
         </p:spPr>
@@ -1795,7 +1795,7 @@
           </a:ln>
           <a:extLst>
             <a:ext uri="{C572A759-6A51-4108-AA02-DFA0A04FC94B}">
-              <ma14:wrappingTextBoxFlag xmlns:ma14="http://schemas.microsoft.com/office/mac/drawingml/2011/main" xmlns="" val="1"/>
+              <ma14:wrappingTextBoxFlag xmlns="" xmlns:ma14="http://schemas.microsoft.com/office/mac/drawingml/2011/main" val="1"/>
             </a:ext>
           </a:extLst>
         </p:spPr>
@@ -2661,7 +2661,7 @@
           </a:ln>
           <a:extLst>
             <a:ext uri="{C572A759-6A51-4108-AA02-DFA0A04FC94B}">
-              <ma14:wrappingTextBoxFlag xmlns:ma14="http://schemas.microsoft.com/office/mac/drawingml/2011/main" xmlns="" val="1"/>
+              <ma14:wrappingTextBoxFlag xmlns="" xmlns:ma14="http://schemas.microsoft.com/office/mac/drawingml/2011/main" val="1"/>
             </a:ext>
           </a:extLst>
         </p:spPr>
@@ -2989,7 +2989,7 @@
           </a:ln>
           <a:extLst>
             <a:ext uri="{C572A759-6A51-4108-AA02-DFA0A04FC94B}">
-              <ma14:wrappingTextBoxFlag xmlns:ma14="http://schemas.microsoft.com/office/mac/drawingml/2011/main" xmlns="" val="1"/>
+              <ma14:wrappingTextBoxFlag xmlns="" xmlns:ma14="http://schemas.microsoft.com/office/mac/drawingml/2011/main" val="1"/>
             </a:ext>
           </a:extLst>
         </p:spPr>
@@ -3297,7 +3297,7 @@
           </a:ln>
           <a:extLst>
             <a:ext uri="{C572A759-6A51-4108-AA02-DFA0A04FC94B}">
-              <ma14:wrappingTextBoxFlag xmlns:ma14="http://schemas.microsoft.com/office/mac/drawingml/2011/main" xmlns="" val="1"/>
+              <ma14:wrappingTextBoxFlag xmlns="" xmlns:ma14="http://schemas.microsoft.com/office/mac/drawingml/2011/main" val="1"/>
             </a:ext>
           </a:extLst>
         </p:spPr>
@@ -3518,7 +3518,7 @@
           </a:ln>
           <a:extLst>
             <a:ext uri="{C572A759-6A51-4108-AA02-DFA0A04FC94B}">
-              <ma14:wrappingTextBoxFlag xmlns:ma14="http://schemas.microsoft.com/office/mac/drawingml/2011/main" xmlns="" val="1"/>
+              <ma14:wrappingTextBoxFlag xmlns="" xmlns:ma14="http://schemas.microsoft.com/office/mac/drawingml/2011/main" val="1"/>
             </a:ext>
           </a:extLst>
         </p:spPr>

</xml_diff>

<commit_message>
minor edits to poster
</commit_message>
<xml_diff>
--- a/UGS_FYP_Poster_CS10899.pptx
+++ b/UGS_FYP_Poster_CS10899.pptx
@@ -373,7 +373,7 @@
           <a:noFill/>
           <a:extLst>
             <a:ext uri="{909E8E84-426E-40dd-AFC4-6F175D3DCCD1}">
-              <a14:hiddenFill xmlns="" xmlns:a14="http://schemas.microsoft.com/office/drawing/2010/main">
+              <a14:hiddenFill xmlns:a14="http://schemas.microsoft.com/office/drawing/2010/main" xmlns="">
                 <a:solidFill>
                   <a:srgbClr val="FFFFFF"/>
                 </a:solidFill>
@@ -420,7 +420,7 @@
           <a:noFill/>
           <a:extLst>
             <a:ext uri="{909E8E84-426E-40dd-AFC4-6F175D3DCCD1}">
-              <a14:hiddenFill xmlns="" xmlns:a14="http://schemas.microsoft.com/office/drawing/2010/main">
+              <a14:hiddenFill xmlns:a14="http://schemas.microsoft.com/office/drawing/2010/main" xmlns="">
                 <a:solidFill>
                   <a:srgbClr val="FFFFFF"/>
                 </a:solidFill>
@@ -1106,7 +1106,7 @@
           </a:ln>
           <a:extLst>
             <a:ext uri="{C572A759-6A51-4108-AA02-DFA0A04FC94B}">
-              <ma14:wrappingTextBoxFlag xmlns:ma14="http://schemas.microsoft.com/office/mac/drawingml/2011/main" xmlns="" val="1"/>
+              <ma14:wrappingTextBoxFlag xmlns="" xmlns:ma14="http://schemas.microsoft.com/office/mac/drawingml/2011/main" val="1"/>
             </a:ext>
           </a:extLst>
         </p:spPr>
@@ -1351,7 +1351,7 @@
           </a:ln>
           <a:extLst>
             <a:ext uri="{C572A759-6A51-4108-AA02-DFA0A04FC94B}">
-              <ma14:wrappingTextBoxFlag xmlns:ma14="http://schemas.microsoft.com/office/mac/drawingml/2011/main" xmlns="" val="1"/>
+              <ma14:wrappingTextBoxFlag xmlns="" xmlns:ma14="http://schemas.microsoft.com/office/mac/drawingml/2011/main" val="1"/>
             </a:ext>
           </a:extLst>
         </p:spPr>
@@ -1551,7 +1551,7 @@
           </a:ln>
           <a:extLst>
             <a:ext uri="{C572A759-6A51-4108-AA02-DFA0A04FC94B}">
-              <ma14:wrappingTextBoxFlag xmlns:ma14="http://schemas.microsoft.com/office/mac/drawingml/2011/main" xmlns="" val="1"/>
+              <ma14:wrappingTextBoxFlag xmlns="" xmlns:ma14="http://schemas.microsoft.com/office/mac/drawingml/2011/main" val="1"/>
             </a:ext>
           </a:extLst>
         </p:spPr>
@@ -1634,8 +1634,8 @@
         </p:nvSpPr>
         <p:spPr>
           <a:xfrm>
-            <a:off x="9663146" y="8151842"/>
-            <a:ext cx="11752086" cy="6254185"/>
+            <a:off x="9615912" y="7940742"/>
+            <a:ext cx="11752086" cy="6805618"/>
           </a:xfrm>
           <a:prstGeom prst="rect">
             <a:avLst/>
@@ -1646,7 +1646,7 @@
           </a:ln>
           <a:extLst>
             <a:ext uri="{C572A759-6A51-4108-AA02-DFA0A04FC94B}">
-              <ma14:wrappingTextBoxFlag xmlns:ma14="http://schemas.microsoft.com/office/mac/drawingml/2011/main" xmlns="" val="1"/>
+              <ma14:wrappingTextBoxFlag xmlns="" xmlns:ma14="http://schemas.microsoft.com/office/mac/drawingml/2011/main" val="1"/>
             </a:ext>
           </a:extLst>
         </p:spPr>
@@ -1793,6 +1793,44 @@
                 </a:solidFill>
               </a:defRPr>
             </a:pPr>
+            <a:r>
+              <a:rPr lang="en-GB" sz="3000" dirty="0">
+                <a:ea typeface="CMU Sans Serif"/>
+                <a:cs typeface="CMU Sans Serif"/>
+                <a:sym typeface="CMU Sans Serif"/>
+              </a:rPr>
+              <a:t>Stationary accelerometer can be performed to </a:t>
+            </a:r>
+            <a:r>
+              <a:rPr lang="en-GB" sz="3000">
+                <a:ea typeface="CMU Sans Serif"/>
+                <a:cs typeface="CMU Sans Serif"/>
+                <a:sym typeface="CMU Sans Serif"/>
+              </a:rPr>
+              <a:t>improve accuracy.</a:t>
+            </a:r>
+            <a:endParaRPr lang="en-GB" sz="3000" dirty="0">
+              <a:ea typeface="CMU Sans Serif"/>
+              <a:cs typeface="CMU Sans Serif"/>
+              <a:sym typeface="CMU Sans Serif"/>
+            </a:endParaRPr>
+          </a:p>
+          <a:p>
+            <a:pPr marL="457200" indent="-457200" algn="just">
+              <a:lnSpc>
+                <a:spcPct val="100000"/>
+              </a:lnSpc>
+              <a:spcBef>
+                <a:spcPts val="699"/>
+              </a:spcBef>
+              <a:buFont typeface="Arial" panose="020B0604020202020204" pitchFamily="34" charset="0"/>
+              <a:buChar char="•"/>
+              <a:defRPr sz="1800">
+                <a:solidFill>
+                  <a:srgbClr val="000000"/>
+                </a:solidFill>
+              </a:defRPr>
+            </a:pPr>
             <a:endParaRPr lang="en-GB" sz="3000" dirty="0">
               <a:ea typeface="CMU Sans Serif"/>
               <a:cs typeface="CMU Sans Serif"/>
@@ -1827,7 +1865,7 @@
           </a:ln>
           <a:extLst>
             <a:ext uri="{C572A759-6A51-4108-AA02-DFA0A04FC94B}">
-              <ma14:wrappingTextBoxFlag xmlns:ma14="http://schemas.microsoft.com/office/mac/drawingml/2011/main" xmlns="" val="1"/>
+              <ma14:wrappingTextBoxFlag xmlns="" xmlns:ma14="http://schemas.microsoft.com/office/mac/drawingml/2011/main" val="1"/>
             </a:ext>
           </a:extLst>
         </p:spPr>
@@ -2693,7 +2731,7 @@
           </a:ln>
           <a:extLst>
             <a:ext uri="{C572A759-6A51-4108-AA02-DFA0A04FC94B}">
-              <ma14:wrappingTextBoxFlag xmlns:ma14="http://schemas.microsoft.com/office/mac/drawingml/2011/main" xmlns="" val="1"/>
+              <ma14:wrappingTextBoxFlag xmlns="" xmlns:ma14="http://schemas.microsoft.com/office/mac/drawingml/2011/main" val="1"/>
             </a:ext>
           </a:extLst>
         </p:spPr>
@@ -3021,7 +3059,7 @@
           </a:ln>
           <a:extLst>
             <a:ext uri="{C572A759-6A51-4108-AA02-DFA0A04FC94B}">
-              <ma14:wrappingTextBoxFlag xmlns:ma14="http://schemas.microsoft.com/office/mac/drawingml/2011/main" xmlns="" val="1"/>
+              <ma14:wrappingTextBoxFlag xmlns="" xmlns:ma14="http://schemas.microsoft.com/office/mac/drawingml/2011/main" val="1"/>
             </a:ext>
           </a:extLst>
         </p:spPr>
@@ -3329,7 +3367,7 @@
           </a:ln>
           <a:extLst>
             <a:ext uri="{C572A759-6A51-4108-AA02-DFA0A04FC94B}">
-              <ma14:wrappingTextBoxFlag xmlns:ma14="http://schemas.microsoft.com/office/mac/drawingml/2011/main" xmlns="" val="1"/>
+              <ma14:wrappingTextBoxFlag xmlns="" xmlns:ma14="http://schemas.microsoft.com/office/mac/drawingml/2011/main" val="1"/>
             </a:ext>
           </a:extLst>
         </p:spPr>
@@ -3550,7 +3588,7 @@
           </a:ln>
           <a:extLst>
             <a:ext uri="{C572A759-6A51-4108-AA02-DFA0A04FC94B}">
-              <ma14:wrappingTextBoxFlag xmlns:ma14="http://schemas.microsoft.com/office/mac/drawingml/2011/main" xmlns="" val="1"/>
+              <ma14:wrappingTextBoxFlag xmlns="" xmlns:ma14="http://schemas.microsoft.com/office/mac/drawingml/2011/main" val="1"/>
             </a:ext>
           </a:extLst>
         </p:spPr>

</xml_diff>